<commit_message>
Testing Powerpoint and final boolean
</commit_message>
<xml_diff>
--- a/More Files/1.7 and 1.8 documentation .pptx
+++ b/More Files/1.7 and 1.8 documentation .pptx
@@ -129,7 +129,7 @@
 <file path=ppt/revisionInfo.xml><?xml version="1.0" encoding="utf-8"?>
 <p1510:revInfo xmlns:a="http://schemas.openxmlformats.org/drawingml/2006/main" xmlns:r="http://schemas.openxmlformats.org/officeDocument/2006/relationships" xmlns:p1510="http://schemas.microsoft.com/office/powerpoint/2015/10/main">
   <p1510:revLst>
-    <p1510:client id="{4136A639-6618-4C31-B3B8-A4CEEAA0AB2F}" v="8" dt="2023-03-22T22:40:37.862"/>
+    <p1510:client id="{4136A639-6618-4C31-B3B8-A4CEEAA0AB2F}" v="16" dt="2023-04-03T22:08:42.661"/>
   </p1510:revLst>
 </p1510:revInfo>
 </file>
@@ -139,7 +139,7 @@
   <pc:docChgLst>
     <pc:chgData name="Nathan Tasker" userId="7fb81501-9544-4351-adeb-2fbdcdb67d30" providerId="ADAL" clId="{4136A639-6618-4C31-B3B8-A4CEEAA0AB2F}"/>
     <pc:docChg chg="undo custSel modSld">
-      <pc:chgData name="Nathan Tasker" userId="7fb81501-9544-4351-adeb-2fbdcdb67d30" providerId="ADAL" clId="{4136A639-6618-4C31-B3B8-A4CEEAA0AB2F}" dt="2023-03-29T22:16:41.355" v="319" actId="20577"/>
+      <pc:chgData name="Nathan Tasker" userId="7fb81501-9544-4351-adeb-2fbdcdb67d30" providerId="ADAL" clId="{4136A639-6618-4C31-B3B8-A4CEEAA0AB2F}" dt="2023-04-03T22:09:48.061" v="847" actId="1076"/>
       <pc:docMkLst>
         <pc:docMk/>
       </pc:docMkLst>
@@ -265,6 +265,69 @@
           </ac:graphicFrameMkLst>
         </pc:graphicFrameChg>
       </pc:sldChg>
+      <pc:sldChg chg="addSp delSp modSp mod">
+        <pc:chgData name="Nathan Tasker" userId="7fb81501-9544-4351-adeb-2fbdcdb67d30" providerId="ADAL" clId="{4136A639-6618-4C31-B3B8-A4CEEAA0AB2F}" dt="2023-04-03T22:09:48.061" v="847" actId="1076"/>
+        <pc:sldMkLst>
+          <pc:docMk/>
+          <pc:sldMk cId="89592267" sldId="274"/>
+        </pc:sldMkLst>
+        <pc:spChg chg="add mod">
+          <ac:chgData name="Nathan Tasker" userId="7fb81501-9544-4351-adeb-2fbdcdb67d30" providerId="ADAL" clId="{4136A639-6618-4C31-B3B8-A4CEEAA0AB2F}" dt="2023-04-03T22:02:30.865" v="662" actId="20577"/>
+          <ac:spMkLst>
+            <pc:docMk/>
+            <pc:sldMk cId="89592267" sldId="274"/>
+            <ac:spMk id="3" creationId="{22793AF7-ADFD-158C-3C31-1C9425881C02}"/>
+          </ac:spMkLst>
+        </pc:spChg>
+        <pc:spChg chg="add mod">
+          <ac:chgData name="Nathan Tasker" userId="7fb81501-9544-4351-adeb-2fbdcdb67d30" providerId="ADAL" clId="{4136A639-6618-4C31-B3B8-A4CEEAA0AB2F}" dt="2023-04-03T22:03:01.969" v="669" actId="1076"/>
+          <ac:spMkLst>
+            <pc:docMk/>
+            <pc:sldMk cId="89592267" sldId="274"/>
+            <ac:spMk id="5" creationId="{BF878B8A-062D-9093-EB00-8E6A7BC2C821}"/>
+          </ac:spMkLst>
+        </pc:spChg>
+        <pc:spChg chg="add mod">
+          <ac:chgData name="Nathan Tasker" userId="7fb81501-9544-4351-adeb-2fbdcdb67d30" providerId="ADAL" clId="{4136A639-6618-4C31-B3B8-A4CEEAA0AB2F}" dt="2023-04-03T22:04:04.885" v="672" actId="1076"/>
+          <ac:spMkLst>
+            <pc:docMk/>
+            <pc:sldMk cId="89592267" sldId="274"/>
+            <ac:spMk id="6" creationId="{1951B24D-3CE2-3BD9-D7E9-A1776498E799}"/>
+          </ac:spMkLst>
+        </pc:spChg>
+        <pc:spChg chg="add del mod">
+          <ac:chgData name="Nathan Tasker" userId="7fb81501-9544-4351-adeb-2fbdcdb67d30" providerId="ADAL" clId="{4136A639-6618-4C31-B3B8-A4CEEAA0AB2F}" dt="2023-04-03T21:59:06.929" v="553"/>
+          <ac:spMkLst>
+            <pc:docMk/>
+            <pc:sldMk cId="89592267" sldId="274"/>
+            <ac:spMk id="7" creationId="{13408149-16F5-BB46-898F-170874F5918C}"/>
+          </ac:spMkLst>
+        </pc:spChg>
+        <pc:spChg chg="add mod">
+          <ac:chgData name="Nathan Tasker" userId="7fb81501-9544-4351-adeb-2fbdcdb67d30" providerId="ADAL" clId="{4136A639-6618-4C31-B3B8-A4CEEAA0AB2F}" dt="2023-04-03T22:04:41.469" v="701" actId="20577"/>
+          <ac:spMkLst>
+            <pc:docMk/>
+            <pc:sldMk cId="89592267" sldId="274"/>
+            <ac:spMk id="8" creationId="{83F8A63D-426D-5C04-209A-F09AA344973F}"/>
+          </ac:spMkLst>
+        </pc:spChg>
+        <pc:spChg chg="add mod">
+          <ac:chgData name="Nathan Tasker" userId="7fb81501-9544-4351-adeb-2fbdcdb67d30" providerId="ADAL" clId="{4136A639-6618-4C31-B3B8-A4CEEAA0AB2F}" dt="2023-04-03T22:05:41.580" v="705" actId="20577"/>
+          <ac:spMkLst>
+            <pc:docMk/>
+            <pc:sldMk cId="89592267" sldId="274"/>
+            <ac:spMk id="9" creationId="{F0029E11-6718-FA3A-B78A-643D41E4E0BC}"/>
+          </ac:spMkLst>
+        </pc:spChg>
+        <pc:spChg chg="add mod">
+          <ac:chgData name="Nathan Tasker" userId="7fb81501-9544-4351-adeb-2fbdcdb67d30" providerId="ADAL" clId="{4136A639-6618-4C31-B3B8-A4CEEAA0AB2F}" dt="2023-04-03T22:09:48.061" v="847" actId="1076"/>
+          <ac:spMkLst>
+            <pc:docMk/>
+            <pc:sldMk cId="89592267" sldId="274"/>
+            <ac:spMk id="10" creationId="{945BB9D9-0C89-88B0-585C-FAB972059F3B}"/>
+          </ac:spMkLst>
+        </pc:spChg>
+      </pc:sldChg>
     </pc:docChg>
   </pc:docChgLst>
 </pc:chgInfo>
@@ -352,7 +415,7 @@
           <a:p>
             <a:fld id="{F37D28C0-BEB6-42B0-A203-EEE1023219C4}" type="datetimeFigureOut">
               <a:rPr lang="en-NZ" smtClean="0"/>
-              <a:t>30/03/2023</a:t>
+              <a:t>4/04/2023</a:t>
             </a:fld>
             <a:endParaRPr lang="en-NZ"/>
           </a:p>
@@ -1753,7 +1816,7 @@
           <a:p>
             <a:fld id="{9C4A4F43-1C06-40E6-8F87-8B286982E50E}" type="datetimeFigureOut">
               <a:rPr lang="en-NZ" smtClean="0"/>
-              <a:t>30/03/2023</a:t>
+              <a:t>4/04/2023</a:t>
             </a:fld>
             <a:endParaRPr lang="en-NZ" dirty="0"/>
           </a:p>
@@ -1953,7 +2016,7 @@
           <a:p>
             <a:fld id="{9C4A4F43-1C06-40E6-8F87-8B286982E50E}" type="datetimeFigureOut">
               <a:rPr lang="en-NZ" smtClean="0"/>
-              <a:t>30/03/2023</a:t>
+              <a:t>4/04/2023</a:t>
             </a:fld>
             <a:endParaRPr lang="en-NZ" dirty="0"/>
           </a:p>
@@ -2163,7 +2226,7 @@
           <a:p>
             <a:fld id="{9C4A4F43-1C06-40E6-8F87-8B286982E50E}" type="datetimeFigureOut">
               <a:rPr lang="en-NZ" smtClean="0"/>
-              <a:t>30/03/2023</a:t>
+              <a:t>4/04/2023</a:t>
             </a:fld>
             <a:endParaRPr lang="en-NZ" dirty="0"/>
           </a:p>
@@ -2722,7 +2785,7 @@
           <a:p>
             <a:fld id="{9C4A4F43-1C06-40E6-8F87-8B286982E50E}" type="datetimeFigureOut">
               <a:rPr lang="en-NZ" smtClean="0"/>
-              <a:t>30/03/2023</a:t>
+              <a:t>4/04/2023</a:t>
             </a:fld>
             <a:endParaRPr lang="en-NZ" dirty="0"/>
           </a:p>
@@ -2998,7 +3061,7 @@
           <a:p>
             <a:fld id="{9C4A4F43-1C06-40E6-8F87-8B286982E50E}" type="datetimeFigureOut">
               <a:rPr lang="en-NZ" smtClean="0"/>
-              <a:t>30/03/2023</a:t>
+              <a:t>4/04/2023</a:t>
             </a:fld>
             <a:endParaRPr lang="en-NZ" dirty="0"/>
           </a:p>
@@ -3266,7 +3329,7 @@
           <a:p>
             <a:fld id="{9C4A4F43-1C06-40E6-8F87-8B286982E50E}" type="datetimeFigureOut">
               <a:rPr lang="en-NZ" smtClean="0"/>
-              <a:t>30/03/2023</a:t>
+              <a:t>4/04/2023</a:t>
             </a:fld>
             <a:endParaRPr lang="en-NZ" dirty="0"/>
           </a:p>
@@ -3681,7 +3744,7 @@
           <a:p>
             <a:fld id="{9C4A4F43-1C06-40E6-8F87-8B286982E50E}" type="datetimeFigureOut">
               <a:rPr lang="en-NZ" smtClean="0"/>
-              <a:t>30/03/2023</a:t>
+              <a:t>4/04/2023</a:t>
             </a:fld>
             <a:endParaRPr lang="en-NZ" dirty="0"/>
           </a:p>
@@ -3823,7 +3886,7 @@
           <a:p>
             <a:fld id="{9C4A4F43-1C06-40E6-8F87-8B286982E50E}" type="datetimeFigureOut">
               <a:rPr lang="en-NZ" smtClean="0"/>
-              <a:t>30/03/2023</a:t>
+              <a:t>4/04/2023</a:t>
             </a:fld>
             <a:endParaRPr lang="en-NZ" dirty="0"/>
           </a:p>
@@ -3936,7 +3999,7 @@
           <a:p>
             <a:fld id="{9C4A4F43-1C06-40E6-8F87-8B286982E50E}" type="datetimeFigureOut">
               <a:rPr lang="en-NZ" smtClean="0"/>
-              <a:t>30/03/2023</a:t>
+              <a:t>4/04/2023</a:t>
             </a:fld>
             <a:endParaRPr lang="en-NZ" dirty="0"/>
           </a:p>
@@ -4249,7 +4312,7 @@
           <a:p>
             <a:fld id="{9C4A4F43-1C06-40E6-8F87-8B286982E50E}" type="datetimeFigureOut">
               <a:rPr lang="en-NZ" smtClean="0"/>
-              <a:t>30/03/2023</a:t>
+              <a:t>4/04/2023</a:t>
             </a:fld>
             <a:endParaRPr lang="en-NZ" dirty="0"/>
           </a:p>
@@ -4538,7 +4601,7 @@
           <a:p>
             <a:fld id="{9C4A4F43-1C06-40E6-8F87-8B286982E50E}" type="datetimeFigureOut">
               <a:rPr lang="en-NZ" smtClean="0"/>
-              <a:t>30/03/2023</a:t>
+              <a:t>4/04/2023</a:t>
             </a:fld>
             <a:endParaRPr lang="en-NZ" dirty="0"/>
           </a:p>
@@ -4781,7 +4844,7 @@
           <a:p>
             <a:fld id="{9C4A4F43-1C06-40E6-8F87-8B286982E50E}" type="datetimeFigureOut">
               <a:rPr lang="en-NZ" smtClean="0"/>
-              <a:t>30/03/2023</a:t>
+              <a:t>4/04/2023</a:t>
             </a:fld>
             <a:endParaRPr lang="en-NZ" dirty="0"/>
           </a:p>
@@ -7474,6 +7537,509 @@
             <a:r>
               <a:rPr lang="en-NZ" i="1" dirty="0"/>
               <a:t>You must show the results of testing. For each component, include a screenshot proving it works.  You can also include notes about each test. </a:t>
+            </a:r>
+          </a:p>
+        </p:txBody>
+      </p:sp>
+      <p:sp>
+        <p:nvSpPr>
+          <p:cNvPr id="3" name="TextBox 2">
+            <a:extLst>
+              <a:ext uri="{FF2B5EF4-FFF2-40B4-BE49-F238E27FC236}">
+                <a16:creationId xmlns:a16="http://schemas.microsoft.com/office/drawing/2014/main" id="{22793AF7-ADFD-158C-3C31-1C9425881C02}"/>
+              </a:ext>
+            </a:extLst>
+          </p:cNvPr>
+          <p:cNvSpPr txBox="1"/>
+          <p:nvPr/>
+        </p:nvSpPr>
+        <p:spPr>
+          <a:xfrm>
+            <a:off x="749300" y="1727419"/>
+            <a:ext cx="2881751" cy="2062103"/>
+          </a:xfrm>
+          <a:prstGeom prst="rect">
+            <a:avLst/>
+          </a:prstGeom>
+          <a:noFill/>
+        </p:spPr>
+        <p:txBody>
+          <a:bodyPr wrap="none" rtlCol="0">
+            <a:spAutoFit/>
+          </a:bodyPr>
+          <a:lstStyle/>
+          <a:p>
+            <a:r>
+              <a:rPr lang="en-NZ" sz="1600" dirty="0" err="1"/>
+              <a:t>get_initial_payment</a:t>
+            </a:r>
+            <a:r>
+              <a:rPr lang="en-NZ" sz="1600" dirty="0"/>
+              <a:t>()</a:t>
+            </a:r>
+          </a:p>
+          <a:p>
+            <a:r>
+              <a:rPr lang="en-NZ" sz="1600" dirty="0"/>
+              <a:t>Result:</a:t>
+            </a:r>
+            <a:br>
+              <a:rPr lang="en-NZ" dirty="0"/>
+            </a:br>
+            <a:r>
+              <a:rPr lang="en-US" sz="1200" b="1" dirty="0"/>
+              <a:t>Input payment of initial amount (0-10): </a:t>
+            </a:r>
+            <a:r>
+              <a:rPr lang="en-US" sz="1200" b="1" dirty="0">
+                <a:solidFill>
+                  <a:srgbClr val="00B050"/>
+                </a:solidFill>
+              </a:rPr>
+              <a:t>-5</a:t>
+            </a:r>
+          </a:p>
+          <a:p>
+            <a:r>
+              <a:rPr lang="en-US" sz="1200" b="1" dirty="0"/>
+              <a:t>Invalid input. Please try again.</a:t>
+            </a:r>
+          </a:p>
+          <a:p>
+            <a:r>
+              <a:rPr lang="en-US" sz="1200" b="1" dirty="0"/>
+              <a:t>Input payment of initial amount (0-10): </a:t>
+            </a:r>
+            <a:r>
+              <a:rPr lang="en-US" sz="1200" b="1" dirty="0">
+                <a:solidFill>
+                  <a:srgbClr val="00B050"/>
+                </a:solidFill>
+              </a:rPr>
+              <a:t>11</a:t>
+            </a:r>
+          </a:p>
+          <a:p>
+            <a:r>
+              <a:rPr lang="en-US" sz="1200" b="1" dirty="0"/>
+              <a:t>Invalid input. Please try again.</a:t>
+            </a:r>
+          </a:p>
+          <a:p>
+            <a:r>
+              <a:rPr lang="en-US" sz="1200" b="1" dirty="0"/>
+              <a:t>Input payment of initial amount (0-10): </a:t>
+            </a:r>
+            <a:r>
+              <a:rPr lang="en-US" sz="1200" b="1" dirty="0">
+                <a:solidFill>
+                  <a:srgbClr val="00B050"/>
+                </a:solidFill>
+              </a:rPr>
+              <a:t>f</a:t>
+            </a:r>
+          </a:p>
+          <a:p>
+            <a:r>
+              <a:rPr lang="en-US" sz="1200" b="1" dirty="0"/>
+              <a:t>Invalid input. Please try again.</a:t>
+            </a:r>
+          </a:p>
+          <a:p>
+            <a:r>
+              <a:rPr lang="en-US" sz="1200" b="1" dirty="0"/>
+              <a:t>Input payment of initial amount (0-10): </a:t>
+            </a:r>
+            <a:r>
+              <a:rPr lang="en-US" sz="1200" b="1" dirty="0">
+                <a:solidFill>
+                  <a:srgbClr val="00B050"/>
+                </a:solidFill>
+              </a:rPr>
+              <a:t>5</a:t>
+            </a:r>
+            <a:br>
+              <a:rPr lang="en-US" sz="1200" b="1" dirty="0"/>
+            </a:br>
+            <a:r>
+              <a:rPr lang="en-US" sz="1200" b="1" dirty="0"/>
+              <a:t>…</a:t>
+            </a:r>
+            <a:endParaRPr lang="en-NZ" sz="1200" b="1" dirty="0"/>
+          </a:p>
+        </p:txBody>
+      </p:sp>
+      <p:sp>
+        <p:nvSpPr>
+          <p:cNvPr id="5" name="TextBox 4">
+            <a:extLst>
+              <a:ext uri="{FF2B5EF4-FFF2-40B4-BE49-F238E27FC236}">
+                <a16:creationId xmlns:a16="http://schemas.microsoft.com/office/drawing/2014/main" id="{BF878B8A-062D-9093-EB00-8E6A7BC2C821}"/>
+              </a:ext>
+            </a:extLst>
+          </p:cNvPr>
+          <p:cNvSpPr txBox="1"/>
+          <p:nvPr/>
+        </p:nvSpPr>
+        <p:spPr>
+          <a:xfrm>
+            <a:off x="3755432" y="1727419"/>
+            <a:ext cx="3365537" cy="1877437"/>
+          </a:xfrm>
+          <a:prstGeom prst="rect">
+            <a:avLst/>
+          </a:prstGeom>
+          <a:noFill/>
+        </p:spPr>
+        <p:txBody>
+          <a:bodyPr wrap="none" rtlCol="0">
+            <a:spAutoFit/>
+          </a:bodyPr>
+          <a:lstStyle/>
+          <a:p>
+            <a:r>
+              <a:rPr lang="en-NZ" sz="1600" dirty="0" err="1"/>
+              <a:t>ask_to_play</a:t>
+            </a:r>
+            <a:r>
+              <a:rPr lang="en-NZ" sz="1600" dirty="0"/>
+              <a:t>()</a:t>
+            </a:r>
+            <a:br>
+              <a:rPr lang="en-NZ" sz="1600" dirty="0"/>
+            </a:br>
+            <a:r>
+              <a:rPr lang="en-NZ" sz="1600" dirty="0"/>
+              <a:t>Result:</a:t>
+            </a:r>
+            <a:br>
+              <a:rPr lang="en-NZ" dirty="0"/>
+            </a:br>
+            <a:r>
+              <a:rPr lang="en-US" sz="1200" b="1" dirty="0"/>
+              <a:t>…</a:t>
+            </a:r>
+            <a:br>
+              <a:rPr lang="en-US" sz="1200" b="1" dirty="0"/>
+            </a:br>
+            <a:r>
+              <a:rPr lang="en-US" sz="1200" b="1" dirty="0"/>
+              <a:t>Do you want to spend $1 to play a round? (y/n): </a:t>
+            </a:r>
+            <a:r>
+              <a:rPr lang="en-US" sz="1200" b="1" dirty="0">
+                <a:solidFill>
+                  <a:srgbClr val="00B050"/>
+                </a:solidFill>
+              </a:rPr>
+              <a:t>f</a:t>
+            </a:r>
+          </a:p>
+          <a:p>
+            <a:r>
+              <a:rPr lang="en-US" sz="1200" b="1" dirty="0"/>
+              <a:t>Invalid input. Try again.</a:t>
+            </a:r>
+          </a:p>
+          <a:p>
+            <a:r>
+              <a:rPr lang="en-US" sz="1200" b="1" dirty="0"/>
+              <a:t>Do you want to spend $1 to play a round? (y/n): </a:t>
+            </a:r>
+            <a:r>
+              <a:rPr lang="en-US" sz="1200" b="1" dirty="0">
+                <a:solidFill>
+                  <a:srgbClr val="00B050"/>
+                </a:solidFill>
+              </a:rPr>
+              <a:t>1</a:t>
+            </a:r>
+          </a:p>
+          <a:p>
+            <a:r>
+              <a:rPr lang="en-US" sz="1200" b="1" dirty="0"/>
+              <a:t>Invalid input. Try again.</a:t>
+            </a:r>
+          </a:p>
+          <a:p>
+            <a:r>
+              <a:rPr lang="en-US" sz="1200" b="1" dirty="0"/>
+              <a:t>Do you want to spend $1 to play a round? (y/n): </a:t>
+            </a:r>
+            <a:r>
+              <a:rPr lang="en-US" sz="1200" b="1" dirty="0">
+                <a:solidFill>
+                  <a:srgbClr val="00B050"/>
+                </a:solidFill>
+              </a:rPr>
+              <a:t>y</a:t>
+            </a:r>
+            <a:br>
+              <a:rPr lang="en-US" sz="1200" b="1" dirty="0">
+                <a:solidFill>
+                  <a:srgbClr val="00B050"/>
+                </a:solidFill>
+              </a:rPr>
+            </a:br>
+            <a:r>
+              <a:rPr lang="en-US" sz="1200" b="1" dirty="0"/>
+              <a:t>…</a:t>
+            </a:r>
+            <a:endParaRPr lang="en-NZ" sz="1200" b="1" dirty="0"/>
+          </a:p>
+        </p:txBody>
+      </p:sp>
+      <p:sp>
+        <p:nvSpPr>
+          <p:cNvPr id="6" name="TextBox 5">
+            <a:extLst>
+              <a:ext uri="{FF2B5EF4-FFF2-40B4-BE49-F238E27FC236}">
+                <a16:creationId xmlns:a16="http://schemas.microsoft.com/office/drawing/2014/main" id="{1951B24D-3CE2-3BD9-D7E9-A1776498E799}"/>
+              </a:ext>
+            </a:extLst>
+          </p:cNvPr>
+          <p:cNvSpPr txBox="1"/>
+          <p:nvPr/>
+        </p:nvSpPr>
+        <p:spPr>
+          <a:xfrm>
+            <a:off x="7421406" y="1727419"/>
+            <a:ext cx="1653594" cy="1138773"/>
+          </a:xfrm>
+          <a:prstGeom prst="rect">
+            <a:avLst/>
+          </a:prstGeom>
+          <a:noFill/>
+        </p:spPr>
+        <p:txBody>
+          <a:bodyPr wrap="none" rtlCol="0">
+            <a:spAutoFit/>
+          </a:bodyPr>
+          <a:lstStyle/>
+          <a:p>
+            <a:r>
+              <a:rPr lang="en-NZ" sz="1600" dirty="0" err="1"/>
+              <a:t>get_token</a:t>
+            </a:r>
+            <a:r>
+              <a:rPr lang="en-NZ" sz="1600" dirty="0"/>
+              <a:t>()</a:t>
+            </a:r>
+            <a:br>
+              <a:rPr lang="en-NZ" sz="1600" dirty="0"/>
+            </a:br>
+            <a:r>
+              <a:rPr lang="en-NZ" sz="1600" dirty="0"/>
+              <a:t>Result:</a:t>
+            </a:r>
+            <a:br>
+              <a:rPr lang="en-NZ" sz="1600" dirty="0"/>
+            </a:br>
+            <a:r>
+              <a:rPr lang="en-US" sz="1200" b="1" dirty="0"/>
+              <a:t>…</a:t>
+            </a:r>
+            <a:br>
+              <a:rPr lang="en-US" sz="1200" b="1" dirty="0"/>
+            </a:br>
+            <a:r>
+              <a:rPr lang="en-US" sz="1200" b="1" dirty="0"/>
+              <a:t>Your token is a donkey.</a:t>
+            </a:r>
+            <a:br>
+              <a:rPr lang="en-US" sz="1200" b="1" dirty="0">
+                <a:solidFill>
+                  <a:srgbClr val="00B050"/>
+                </a:solidFill>
+              </a:rPr>
+            </a:br>
+            <a:r>
+              <a:rPr lang="en-US" sz="1200" b="1" dirty="0"/>
+              <a:t>…</a:t>
+            </a:r>
+            <a:endParaRPr lang="en-NZ" sz="1200" b="1" dirty="0"/>
+          </a:p>
+        </p:txBody>
+      </p:sp>
+      <p:sp>
+        <p:nvSpPr>
+          <p:cNvPr id="8" name="TextBox 7">
+            <a:extLst>
+              <a:ext uri="{FF2B5EF4-FFF2-40B4-BE49-F238E27FC236}">
+                <a16:creationId xmlns:a16="http://schemas.microsoft.com/office/drawing/2014/main" id="{83F8A63D-426D-5C04-209A-F09AA344973F}"/>
+              </a:ext>
+            </a:extLst>
+          </p:cNvPr>
+          <p:cNvSpPr txBox="1"/>
+          <p:nvPr/>
+        </p:nvSpPr>
+        <p:spPr>
+          <a:xfrm>
+            <a:off x="749300" y="4293338"/>
+            <a:ext cx="2486515" cy="1138773"/>
+          </a:xfrm>
+          <a:prstGeom prst="rect">
+            <a:avLst/>
+          </a:prstGeom>
+          <a:noFill/>
+        </p:spPr>
+        <p:txBody>
+          <a:bodyPr wrap="none" rtlCol="0">
+            <a:spAutoFit/>
+          </a:bodyPr>
+          <a:lstStyle/>
+          <a:p>
+            <a:r>
+              <a:rPr lang="en-NZ" sz="1600" dirty="0" err="1"/>
+              <a:t>print_prize_message</a:t>
+            </a:r>
+            <a:r>
+              <a:rPr lang="en-NZ" sz="1600" dirty="0"/>
+              <a:t>(value)</a:t>
+            </a:r>
+            <a:br>
+              <a:rPr lang="en-NZ" sz="1600" dirty="0"/>
+            </a:br>
+            <a:r>
+              <a:rPr lang="en-NZ" sz="1600" dirty="0"/>
+              <a:t>Result:</a:t>
+            </a:r>
+            <a:br>
+              <a:rPr lang="en-NZ" sz="1600" dirty="0"/>
+            </a:br>
+            <a:r>
+              <a:rPr lang="en-US" sz="1200" b="1" dirty="0"/>
+              <a:t>…</a:t>
+            </a:r>
+            <a:br>
+              <a:rPr lang="en-US" sz="1200" b="1" dirty="0"/>
+            </a:br>
+            <a:r>
+              <a:rPr lang="en-US" sz="1200" b="1" dirty="0"/>
+              <a:t>Sorry, you didn't win any money.</a:t>
+            </a:r>
+            <a:br>
+              <a:rPr lang="en-US" sz="1200" b="1" dirty="0">
+                <a:solidFill>
+                  <a:srgbClr val="00B050"/>
+                </a:solidFill>
+              </a:rPr>
+            </a:br>
+            <a:r>
+              <a:rPr lang="en-US" sz="1200" b="1" dirty="0"/>
+              <a:t>…</a:t>
+            </a:r>
+            <a:endParaRPr lang="en-NZ" sz="1200" b="1" dirty="0"/>
+          </a:p>
+        </p:txBody>
+      </p:sp>
+      <p:sp>
+        <p:nvSpPr>
+          <p:cNvPr id="9" name="TextBox 8">
+            <a:extLst>
+              <a:ext uri="{FF2B5EF4-FFF2-40B4-BE49-F238E27FC236}">
+                <a16:creationId xmlns:a16="http://schemas.microsoft.com/office/drawing/2014/main" id="{F0029E11-6718-FA3A-B78A-643D41E4E0BC}"/>
+              </a:ext>
+            </a:extLst>
+          </p:cNvPr>
+          <p:cNvSpPr txBox="1"/>
+          <p:nvPr/>
+        </p:nvSpPr>
+        <p:spPr>
+          <a:xfrm>
+            <a:off x="3876012" y="4293338"/>
+            <a:ext cx="1702710" cy="1138773"/>
+          </a:xfrm>
+          <a:prstGeom prst="rect">
+            <a:avLst/>
+          </a:prstGeom>
+          <a:noFill/>
+        </p:spPr>
+        <p:txBody>
+          <a:bodyPr wrap="none" rtlCol="0">
+            <a:spAutoFit/>
+          </a:bodyPr>
+          <a:lstStyle/>
+          <a:p>
+            <a:r>
+              <a:rPr lang="en-NZ" sz="1600" dirty="0" err="1"/>
+              <a:t>display_statistics</a:t>
+            </a:r>
+            <a:r>
+              <a:rPr lang="en-NZ" sz="1600" dirty="0"/>
+              <a:t>()</a:t>
+            </a:r>
+            <a:br>
+              <a:rPr lang="en-NZ" sz="1600" dirty="0"/>
+            </a:br>
+            <a:r>
+              <a:rPr lang="en-NZ" sz="1600" dirty="0"/>
+              <a:t>Result:</a:t>
+            </a:r>
+            <a:br>
+              <a:rPr lang="en-NZ" sz="1600" dirty="0"/>
+            </a:br>
+            <a:r>
+              <a:rPr lang="en-US" sz="1200" b="1" dirty="0"/>
+              <a:t>…</a:t>
+            </a:r>
+            <a:br>
+              <a:rPr lang="en-US" sz="1200" b="1" dirty="0"/>
+            </a:br>
+            <a:r>
+              <a:rPr lang="en-US" sz="1200" b="1" dirty="0"/>
+              <a:t>Current Money: $4.00</a:t>
+            </a:r>
+            <a:br>
+              <a:rPr lang="en-US" sz="1200" b="1" dirty="0"/>
+            </a:br>
+            <a:r>
+              <a:rPr lang="en-US" sz="1200" b="1" dirty="0"/>
+              <a:t>…</a:t>
+            </a:r>
+            <a:endParaRPr lang="en-NZ" sz="1200" b="1" dirty="0"/>
+          </a:p>
+        </p:txBody>
+      </p:sp>
+      <p:sp>
+        <p:nvSpPr>
+          <p:cNvPr id="10" name="TextBox 9">
+            <a:extLst>
+              <a:ext uri="{FF2B5EF4-FFF2-40B4-BE49-F238E27FC236}">
+                <a16:creationId xmlns:a16="http://schemas.microsoft.com/office/drawing/2014/main" id="{945BB9D9-0C89-88B0-585C-FAB972059F3B}"/>
+              </a:ext>
+            </a:extLst>
+          </p:cNvPr>
+          <p:cNvSpPr txBox="1"/>
+          <p:nvPr/>
+        </p:nvSpPr>
+        <p:spPr>
+          <a:xfrm>
+            <a:off x="6690708" y="4354893"/>
+            <a:ext cx="3114989" cy="1077218"/>
+          </a:xfrm>
+          <a:prstGeom prst="rect">
+            <a:avLst/>
+          </a:prstGeom>
+          <a:noFill/>
+        </p:spPr>
+        <p:txBody>
+          <a:bodyPr wrap="square" rtlCol="0">
+            <a:spAutoFit/>
+          </a:bodyPr>
+          <a:lstStyle/>
+          <a:p>
+            <a:r>
+              <a:rPr lang="en-NZ" sz="1600" dirty="0"/>
+              <a:t>“</a:t>
+            </a:r>
+            <a:r>
+              <a:rPr lang="en-NZ" sz="1600" dirty="0" err="1"/>
+              <a:t>calculate_money_change</a:t>
+            </a:r>
+            <a:r>
+              <a:rPr lang="en-NZ" sz="1600" dirty="0"/>
+              <a:t>(token)” doesn’t directly print anything, but the results of the display statistics prove that it also works</a:t>
             </a:r>
           </a:p>
         </p:txBody>

</xml_diff>

<commit_message>
calculate money change improvement
</commit_message>
<xml_diff>
--- a/More Files/1.7 and 1.8 documentation .pptx
+++ b/More Files/1.7 and 1.8 documentation .pptx
@@ -129,7 +129,7 @@
 <file path=ppt/revisionInfo.xml><?xml version="1.0" encoding="utf-8"?>
 <p1510:revInfo xmlns:a="http://schemas.openxmlformats.org/drawingml/2006/main" xmlns:r="http://schemas.openxmlformats.org/officeDocument/2006/relationships" xmlns:p1510="http://schemas.microsoft.com/office/powerpoint/2015/10/main">
   <p1510:revLst>
-    <p1510:client id="{4136A639-6618-4C31-B3B8-A4CEEAA0AB2F}" v="16" dt="2023-04-03T22:08:42.661"/>
+    <p1510:client id="{4136A639-6618-4C31-B3B8-A4CEEAA0AB2F}" v="23" dt="2023-04-04T23:23:12.567"/>
   </p1510:revLst>
 </p1510:revInfo>
 </file>
@@ -139,7 +139,7 @@
   <pc:docChgLst>
     <pc:chgData name="Nathan Tasker" userId="7fb81501-9544-4351-adeb-2fbdcdb67d30" providerId="ADAL" clId="{4136A639-6618-4C31-B3B8-A4CEEAA0AB2F}"/>
     <pc:docChg chg="undo custSel modSld">
-      <pc:chgData name="Nathan Tasker" userId="7fb81501-9544-4351-adeb-2fbdcdb67d30" providerId="ADAL" clId="{4136A639-6618-4C31-B3B8-A4CEEAA0AB2F}" dt="2023-04-03T22:09:48.061" v="847" actId="1076"/>
+      <pc:chgData name="Nathan Tasker" userId="7fb81501-9544-4351-adeb-2fbdcdb67d30" providerId="ADAL" clId="{4136A639-6618-4C31-B3B8-A4CEEAA0AB2F}" dt="2023-04-04T23:32:17.992" v="919" actId="1076"/>
       <pc:docMkLst>
         <pc:docMk/>
       </pc:docMkLst>
@@ -167,13 +167,13 @@
         </pc:spChg>
       </pc:sldChg>
       <pc:sldChg chg="modSp mod">
-        <pc:chgData name="Nathan Tasker" userId="7fb81501-9544-4351-adeb-2fbdcdb67d30" providerId="ADAL" clId="{4136A639-6618-4C31-B3B8-A4CEEAA0AB2F}" dt="2023-03-22T22:28:29.687" v="39" actId="20577"/>
+        <pc:chgData name="Nathan Tasker" userId="7fb81501-9544-4351-adeb-2fbdcdb67d30" providerId="ADAL" clId="{4136A639-6618-4C31-B3B8-A4CEEAA0AB2F}" dt="2023-04-04T23:07:20.883" v="871" actId="14100"/>
         <pc:sldMkLst>
           <pc:docMk/>
           <pc:sldMk cId="3838895173" sldId="258"/>
         </pc:sldMkLst>
         <pc:spChg chg="mod">
-          <ac:chgData name="Nathan Tasker" userId="7fb81501-9544-4351-adeb-2fbdcdb67d30" providerId="ADAL" clId="{4136A639-6618-4C31-B3B8-A4CEEAA0AB2F}" dt="2023-03-22T22:28:29.687" v="39" actId="20577"/>
+          <ac:chgData name="Nathan Tasker" userId="7fb81501-9544-4351-adeb-2fbdcdb67d30" providerId="ADAL" clId="{4136A639-6618-4C31-B3B8-A4CEEAA0AB2F}" dt="2023-04-04T23:07:20.883" v="871" actId="14100"/>
           <ac:spMkLst>
             <pc:docMk/>
             <pc:sldMk cId="3838895173" sldId="258"/>
@@ -265,12 +265,83 @@
           </ac:graphicFrameMkLst>
         </pc:graphicFrameChg>
       </pc:sldChg>
+      <pc:sldChg chg="addSp delSp modSp mod modNotesTx">
+        <pc:chgData name="Nathan Tasker" userId="7fb81501-9544-4351-adeb-2fbdcdb67d30" providerId="ADAL" clId="{4136A639-6618-4C31-B3B8-A4CEEAA0AB2F}" dt="2023-04-04T23:32:17.992" v="919" actId="1076"/>
+        <pc:sldMkLst>
+          <pc:docMk/>
+          <pc:sldMk cId="270828811" sldId="273"/>
+        </pc:sldMkLst>
+        <pc:spChg chg="mod">
+          <ac:chgData name="Nathan Tasker" userId="7fb81501-9544-4351-adeb-2fbdcdb67d30" providerId="ADAL" clId="{4136A639-6618-4C31-B3B8-A4CEEAA0AB2F}" dt="2023-04-04T23:08:55.382" v="884" actId="20577"/>
+          <ac:spMkLst>
+            <pc:docMk/>
+            <pc:sldMk cId="270828811" sldId="273"/>
+            <ac:spMk id="2" creationId="{1CC5D32F-7C18-4D00-8D54-2FB046F0A206}"/>
+          </ac:spMkLst>
+        </pc:spChg>
+        <pc:spChg chg="add mod">
+          <ac:chgData name="Nathan Tasker" userId="7fb81501-9544-4351-adeb-2fbdcdb67d30" providerId="ADAL" clId="{4136A639-6618-4C31-B3B8-A4CEEAA0AB2F}" dt="2023-04-04T23:32:14.098" v="918" actId="1076"/>
+          <ac:spMkLst>
+            <pc:docMk/>
+            <pc:sldMk cId="270828811" sldId="273"/>
+            <ac:spMk id="3" creationId="{70933A98-86B4-2013-1F20-A6767A27A50E}"/>
+          </ac:spMkLst>
+        </pc:spChg>
+        <pc:spChg chg="mod">
+          <ac:chgData name="Nathan Tasker" userId="7fb81501-9544-4351-adeb-2fbdcdb67d30" providerId="ADAL" clId="{4136A639-6618-4C31-B3B8-A4CEEAA0AB2F}" dt="2023-04-04T23:07:52.740" v="880" actId="20577"/>
+          <ac:spMkLst>
+            <pc:docMk/>
+            <pc:sldMk cId="270828811" sldId="273"/>
+            <ac:spMk id="4" creationId="{8CD07A82-A944-4A9B-9A52-515DAC30878A}"/>
+          </ac:spMkLst>
+        </pc:spChg>
+        <pc:spChg chg="add mod">
+          <ac:chgData name="Nathan Tasker" userId="7fb81501-9544-4351-adeb-2fbdcdb67d30" providerId="ADAL" clId="{4136A639-6618-4C31-B3B8-A4CEEAA0AB2F}" dt="2023-04-04T23:32:17.992" v="919" actId="1076"/>
+          <ac:spMkLst>
+            <pc:docMk/>
+            <pc:sldMk cId="270828811" sldId="273"/>
+            <ac:spMk id="5" creationId="{171C5E12-0149-A6F8-6F4C-BA7CC3B9D583}"/>
+          </ac:spMkLst>
+        </pc:spChg>
+        <pc:spChg chg="add del">
+          <ac:chgData name="Nathan Tasker" userId="7fb81501-9544-4351-adeb-2fbdcdb67d30" providerId="ADAL" clId="{4136A639-6618-4C31-B3B8-A4CEEAA0AB2F}" dt="2023-04-04T23:15:17.068" v="897"/>
+          <ac:spMkLst>
+            <pc:docMk/>
+            <pc:sldMk cId="270828811" sldId="273"/>
+            <ac:spMk id="6" creationId="{B0B5C368-D4A7-1793-F869-A043A051E163}"/>
+          </ac:spMkLst>
+        </pc:spChg>
+        <pc:spChg chg="add mod">
+          <ac:chgData name="Nathan Tasker" userId="7fb81501-9544-4351-adeb-2fbdcdb67d30" providerId="ADAL" clId="{4136A639-6618-4C31-B3B8-A4CEEAA0AB2F}" dt="2023-04-04T23:32:10.982" v="917" actId="1076"/>
+          <ac:spMkLst>
+            <pc:docMk/>
+            <pc:sldMk cId="270828811" sldId="273"/>
+            <ac:spMk id="7" creationId="{BB538C66-A9AB-9292-BE01-D913E793E060}"/>
+          </ac:spMkLst>
+        </pc:spChg>
+        <pc:spChg chg="add mod">
+          <ac:chgData name="Nathan Tasker" userId="7fb81501-9544-4351-adeb-2fbdcdb67d30" providerId="ADAL" clId="{4136A639-6618-4C31-B3B8-A4CEEAA0AB2F}" dt="2023-04-04T23:32:07.479" v="916" actId="1076"/>
+          <ac:spMkLst>
+            <pc:docMk/>
+            <pc:sldMk cId="270828811" sldId="273"/>
+            <ac:spMk id="8" creationId="{5741FB59-CE58-B773-73C4-D33E7B669B7D}"/>
+          </ac:spMkLst>
+        </pc:spChg>
+      </pc:sldChg>
       <pc:sldChg chg="addSp delSp modSp mod">
-        <pc:chgData name="Nathan Tasker" userId="7fb81501-9544-4351-adeb-2fbdcdb67d30" providerId="ADAL" clId="{4136A639-6618-4C31-B3B8-A4CEEAA0AB2F}" dt="2023-04-03T22:09:48.061" v="847" actId="1076"/>
+        <pc:chgData name="Nathan Tasker" userId="7fb81501-9544-4351-adeb-2fbdcdb67d30" providerId="ADAL" clId="{4136A639-6618-4C31-B3B8-A4CEEAA0AB2F}" dt="2023-04-04T23:08:42.172" v="883" actId="20577"/>
         <pc:sldMkLst>
           <pc:docMk/>
           <pc:sldMk cId="89592267" sldId="274"/>
         </pc:sldMkLst>
+        <pc:spChg chg="mod">
+          <ac:chgData name="Nathan Tasker" userId="7fb81501-9544-4351-adeb-2fbdcdb67d30" providerId="ADAL" clId="{4136A639-6618-4C31-B3B8-A4CEEAA0AB2F}" dt="2023-04-04T23:08:42.172" v="883" actId="20577"/>
+          <ac:spMkLst>
+            <pc:docMk/>
+            <pc:sldMk cId="89592267" sldId="274"/>
+            <ac:spMk id="2" creationId="{1CC5D32F-7C18-4D00-8D54-2FB046F0A206}"/>
+          </ac:spMkLst>
+        </pc:spChg>
         <pc:spChg chg="add mod">
           <ac:chgData name="Nathan Tasker" userId="7fb81501-9544-4351-adeb-2fbdcdb67d30" providerId="ADAL" clId="{4136A639-6618-4C31-B3B8-A4CEEAA0AB2F}" dt="2023-04-03T22:02:30.865" v="662" actId="20577"/>
           <ac:spMkLst>
@@ -415,7 +486,7 @@
           <a:p>
             <a:fld id="{F37D28C0-BEB6-42B0-A203-EEE1023219C4}" type="datetimeFigureOut">
               <a:rPr lang="en-NZ" smtClean="0"/>
-              <a:t>4/04/2023</a:t>
+              <a:t>5/04/2023</a:t>
             </a:fld>
             <a:endParaRPr lang="en-NZ"/>
           </a:p>
@@ -1816,7 +1887,7 @@
           <a:p>
             <a:fld id="{9C4A4F43-1C06-40E6-8F87-8B286982E50E}" type="datetimeFigureOut">
               <a:rPr lang="en-NZ" smtClean="0"/>
-              <a:t>4/04/2023</a:t>
+              <a:t>5/04/2023</a:t>
             </a:fld>
             <a:endParaRPr lang="en-NZ" dirty="0"/>
           </a:p>
@@ -2016,7 +2087,7 @@
           <a:p>
             <a:fld id="{9C4A4F43-1C06-40E6-8F87-8B286982E50E}" type="datetimeFigureOut">
               <a:rPr lang="en-NZ" smtClean="0"/>
-              <a:t>4/04/2023</a:t>
+              <a:t>5/04/2023</a:t>
             </a:fld>
             <a:endParaRPr lang="en-NZ" dirty="0"/>
           </a:p>
@@ -2226,7 +2297,7 @@
           <a:p>
             <a:fld id="{9C4A4F43-1C06-40E6-8F87-8B286982E50E}" type="datetimeFigureOut">
               <a:rPr lang="en-NZ" smtClean="0"/>
-              <a:t>4/04/2023</a:t>
+              <a:t>5/04/2023</a:t>
             </a:fld>
             <a:endParaRPr lang="en-NZ" dirty="0"/>
           </a:p>
@@ -2785,7 +2856,7 @@
           <a:p>
             <a:fld id="{9C4A4F43-1C06-40E6-8F87-8B286982E50E}" type="datetimeFigureOut">
               <a:rPr lang="en-NZ" smtClean="0"/>
-              <a:t>4/04/2023</a:t>
+              <a:t>5/04/2023</a:t>
             </a:fld>
             <a:endParaRPr lang="en-NZ" dirty="0"/>
           </a:p>
@@ -3061,7 +3132,7 @@
           <a:p>
             <a:fld id="{9C4A4F43-1C06-40E6-8F87-8B286982E50E}" type="datetimeFigureOut">
               <a:rPr lang="en-NZ" smtClean="0"/>
-              <a:t>4/04/2023</a:t>
+              <a:t>5/04/2023</a:t>
             </a:fld>
             <a:endParaRPr lang="en-NZ" dirty="0"/>
           </a:p>
@@ -3329,7 +3400,7 @@
           <a:p>
             <a:fld id="{9C4A4F43-1C06-40E6-8F87-8B286982E50E}" type="datetimeFigureOut">
               <a:rPr lang="en-NZ" smtClean="0"/>
-              <a:t>4/04/2023</a:t>
+              <a:t>5/04/2023</a:t>
             </a:fld>
             <a:endParaRPr lang="en-NZ" dirty="0"/>
           </a:p>
@@ -3744,7 +3815,7 @@
           <a:p>
             <a:fld id="{9C4A4F43-1C06-40E6-8F87-8B286982E50E}" type="datetimeFigureOut">
               <a:rPr lang="en-NZ" smtClean="0"/>
-              <a:t>4/04/2023</a:t>
+              <a:t>5/04/2023</a:t>
             </a:fld>
             <a:endParaRPr lang="en-NZ" dirty="0"/>
           </a:p>
@@ -3886,7 +3957,7 @@
           <a:p>
             <a:fld id="{9C4A4F43-1C06-40E6-8F87-8B286982E50E}" type="datetimeFigureOut">
               <a:rPr lang="en-NZ" smtClean="0"/>
-              <a:t>4/04/2023</a:t>
+              <a:t>5/04/2023</a:t>
             </a:fld>
             <a:endParaRPr lang="en-NZ" dirty="0"/>
           </a:p>
@@ -3999,7 +4070,7 @@
           <a:p>
             <a:fld id="{9C4A4F43-1C06-40E6-8F87-8B286982E50E}" type="datetimeFigureOut">
               <a:rPr lang="en-NZ" smtClean="0"/>
-              <a:t>4/04/2023</a:t>
+              <a:t>5/04/2023</a:t>
             </a:fld>
             <a:endParaRPr lang="en-NZ" dirty="0"/>
           </a:p>
@@ -4312,7 +4383,7 @@
           <a:p>
             <a:fld id="{9C4A4F43-1C06-40E6-8F87-8B286982E50E}" type="datetimeFigureOut">
               <a:rPr lang="en-NZ" smtClean="0"/>
-              <a:t>4/04/2023</a:t>
+              <a:t>5/04/2023</a:t>
             </a:fld>
             <a:endParaRPr lang="en-NZ" dirty="0"/>
           </a:p>
@@ -4601,7 +4672,7 @@
           <a:p>
             <a:fld id="{9C4A4F43-1C06-40E6-8F87-8B286982E50E}" type="datetimeFigureOut">
               <a:rPr lang="en-NZ" smtClean="0"/>
-              <a:t>4/04/2023</a:t>
+              <a:t>5/04/2023</a:t>
             </a:fld>
             <a:endParaRPr lang="en-NZ" dirty="0"/>
           </a:p>
@@ -4844,7 +4915,7 @@
           <a:p>
             <a:fld id="{9C4A4F43-1C06-40E6-8F87-8B286982E50E}" type="datetimeFigureOut">
               <a:rPr lang="en-NZ" smtClean="0"/>
-              <a:t>4/04/2023</a:t>
+              <a:t>5/04/2023</a:t>
             </a:fld>
             <a:endParaRPr lang="en-NZ" dirty="0"/>
           </a:p>
@@ -5889,8 +5960,8 @@
         </p:nvSpPr>
         <p:spPr>
           <a:xfrm>
-            <a:off x="1693460" y="1914475"/>
-            <a:ext cx="8520600" cy="1750800"/>
+            <a:off x="1693460" y="1914474"/>
+            <a:ext cx="8520600" cy="2315881"/>
           </a:xfrm>
           <a:prstGeom prst="rect">
             <a:avLst/>
@@ -6100,7 +6171,7 @@
               <a:t>Link to GitHub Repository: </a:t>
             </a:r>
             <a:r>
-              <a:rPr lang="en-NZ" sz="2000" b="1" dirty="0">
+              <a:rPr lang="en-NZ" sz="1200" b="1" dirty="0">
                 <a:solidFill>
                   <a:srgbClr val="274E13"/>
                 </a:solidFill>
@@ -6108,7 +6179,7 @@
               </a:rPr>
               <a:t>github.com/NathanTaskerSchool/Lucky-Unicorn</a:t>
             </a:r>
-            <a:endParaRPr lang="en-NZ" sz="2000" b="1" dirty="0">
+            <a:endParaRPr lang="en-NZ" sz="1200" b="1" dirty="0">
               <a:solidFill>
                 <a:srgbClr val="274E13"/>
               </a:solidFill>
@@ -6155,8 +6226,22 @@
                   <a:srgbClr val="274E13"/>
                 </a:solidFill>
               </a:rPr>
-              <a:t>Links to Trello board / project management tools: [here]</a:t>
-            </a:r>
+              <a:t>Links to Trello board / project management tools: </a:t>
+            </a:r>
+            <a:r>
+              <a:rPr lang="en-NZ" sz="1200" b="1" dirty="0">
+                <a:solidFill>
+                  <a:srgbClr val="274E13"/>
+                </a:solidFill>
+                <a:hlinkClick r:id="rId3"/>
+              </a:rPr>
+              <a:t>trello.com/invite/b/Gy3l6orY/ATTI3fa1ba50f3cdd9cdc8b5cd2509cd05f88B420B2C/lucky-unicorn</a:t>
+            </a:r>
+            <a:endParaRPr lang="en-NZ" sz="1200" b="1" dirty="0">
+              <a:solidFill>
+                <a:srgbClr val="274E13"/>
+              </a:solidFill>
+            </a:endParaRPr>
           </a:p>
           <a:p>
             <a:pPr marL="0" indent="0">
@@ -7386,7 +7471,7 @@
           <a:p>
             <a:r>
               <a:rPr lang="en-NZ" sz="4000" dirty="0"/>
-              <a:t>[Component name]: Trialling </a:t>
+              <a:t>Trialling </a:t>
             </a:r>
           </a:p>
         </p:txBody>
@@ -7438,6 +7523,578 @@
               <a:t>Trialling is not the same as testing. Trialling is about finding different ways of building the same component. Show evidence of  your trialling  here. Select one of your trials for further development and give reasons for your choice. </a:t>
             </a:r>
             <a:endParaRPr lang="en-NZ" dirty="0"/>
+          </a:p>
+        </p:txBody>
+      </p:sp>
+      <p:sp>
+        <p:nvSpPr>
+          <p:cNvPr id="3" name="TextBox 2">
+            <a:extLst>
+              <a:ext uri="{FF2B5EF4-FFF2-40B4-BE49-F238E27FC236}">
+                <a16:creationId xmlns:a16="http://schemas.microsoft.com/office/drawing/2014/main" id="{70933A98-86B4-2013-1F20-A6767A27A50E}"/>
+              </a:ext>
+            </a:extLst>
+          </p:cNvPr>
+          <p:cNvSpPr txBox="1"/>
+          <p:nvPr/>
+        </p:nvSpPr>
+        <p:spPr>
+          <a:xfrm>
+            <a:off x="126302" y="2598345"/>
+            <a:ext cx="4606471" cy="1785104"/>
+          </a:xfrm>
+          <a:prstGeom prst="rect">
+            <a:avLst/>
+          </a:prstGeom>
+          <a:noFill/>
+        </p:spPr>
+        <p:txBody>
+          <a:bodyPr wrap="square" rtlCol="0">
+            <a:spAutoFit/>
+          </a:bodyPr>
+          <a:lstStyle/>
+          <a:p>
+            <a:r>
+              <a:rPr lang="en-US" sz="1000" dirty="0"/>
+              <a:t>def </a:t>
+            </a:r>
+            <a:r>
+              <a:rPr lang="en-US" sz="1000" dirty="0" err="1"/>
+              <a:t>get_initial_payment</a:t>
+            </a:r>
+            <a:r>
+              <a:rPr lang="en-US" sz="1000" dirty="0"/>
+              <a:t>():</a:t>
+            </a:r>
+          </a:p>
+          <a:p>
+            <a:r>
+              <a:rPr lang="en-US" sz="1000" dirty="0"/>
+              <a:t>    while True:</a:t>
+            </a:r>
+          </a:p>
+          <a:p>
+            <a:r>
+              <a:rPr lang="en-US" sz="1000" dirty="0"/>
+              <a:t>        value = input(</a:t>
+            </a:r>
+            <a:r>
+              <a:rPr lang="en-US" sz="1000" dirty="0" err="1"/>
+              <a:t>f"Input</a:t>
+            </a:r>
+            <a:r>
+              <a:rPr lang="en-US" sz="1000" dirty="0"/>
+              <a:t> payment of initial amount (0-{MAX_STARTING_MONEY}): ")</a:t>
+            </a:r>
+          </a:p>
+          <a:p>
+            <a:r>
+              <a:rPr lang="en-US" sz="1000" dirty="0"/>
+              <a:t>        try:</a:t>
+            </a:r>
+          </a:p>
+          <a:p>
+            <a:r>
+              <a:rPr lang="en-US" sz="1000" dirty="0"/>
+              <a:t>            value = float(value)</a:t>
+            </a:r>
+          </a:p>
+          <a:p>
+            <a:r>
+              <a:rPr lang="en-US" sz="1000" dirty="0"/>
+              <a:t>            if value &gt; MAX_STARTING_MONEY or value &lt;= 0:</a:t>
+            </a:r>
+          </a:p>
+          <a:p>
+            <a:r>
+              <a:rPr lang="en-US" sz="1000" dirty="0"/>
+              <a:t>                print("Invalid input. Please try again.")</a:t>
+            </a:r>
+          </a:p>
+          <a:p>
+            <a:r>
+              <a:rPr lang="en-US" sz="1000" dirty="0"/>
+              <a:t>            else:</a:t>
+            </a:r>
+          </a:p>
+          <a:p>
+            <a:r>
+              <a:rPr lang="en-US" sz="1000" dirty="0"/>
+              <a:t>                return value</a:t>
+            </a:r>
+          </a:p>
+          <a:p>
+            <a:r>
+              <a:rPr lang="en-US" sz="1000" dirty="0"/>
+              <a:t>        except </a:t>
+            </a:r>
+            <a:r>
+              <a:rPr lang="en-US" sz="1000" dirty="0" err="1"/>
+              <a:t>ValueError</a:t>
+            </a:r>
+            <a:r>
+              <a:rPr lang="en-US" sz="1000" dirty="0"/>
+              <a:t>:</a:t>
+            </a:r>
+          </a:p>
+          <a:p>
+            <a:r>
+              <a:rPr lang="en-US" sz="1000" dirty="0"/>
+              <a:t>            print("Invalid input. Please try again.")</a:t>
+            </a:r>
+            <a:endParaRPr lang="en-NZ" sz="1000" dirty="0"/>
+          </a:p>
+        </p:txBody>
+      </p:sp>
+      <p:sp>
+        <p:nvSpPr>
+          <p:cNvPr id="5" name="TextBox 4">
+            <a:extLst>
+              <a:ext uri="{FF2B5EF4-FFF2-40B4-BE49-F238E27FC236}">
+                <a16:creationId xmlns:a16="http://schemas.microsoft.com/office/drawing/2014/main" id="{171C5E12-0149-A6F8-6F4C-BA7CC3B9D583}"/>
+              </a:ext>
+            </a:extLst>
+          </p:cNvPr>
+          <p:cNvSpPr txBox="1"/>
+          <p:nvPr/>
+        </p:nvSpPr>
+        <p:spPr>
+          <a:xfrm>
+            <a:off x="126302" y="4696580"/>
+            <a:ext cx="5052986" cy="1631216"/>
+          </a:xfrm>
+          <a:prstGeom prst="rect">
+            <a:avLst/>
+          </a:prstGeom>
+          <a:noFill/>
+        </p:spPr>
+        <p:txBody>
+          <a:bodyPr wrap="none" rtlCol="0">
+            <a:spAutoFit/>
+          </a:bodyPr>
+          <a:lstStyle/>
+          <a:p>
+            <a:r>
+              <a:rPr lang="en-US" sz="1000" dirty="0"/>
+              <a:t>def </a:t>
+            </a:r>
+            <a:r>
+              <a:rPr lang="en-US" sz="1000" dirty="0" err="1"/>
+              <a:t>get_initial_payment</a:t>
+            </a:r>
+            <a:r>
+              <a:rPr lang="en-US" sz="1000" dirty="0"/>
+              <a:t>():</a:t>
+            </a:r>
+          </a:p>
+          <a:p>
+            <a:r>
+              <a:rPr lang="en-US" sz="1000" dirty="0"/>
+              <a:t>    value = 0</a:t>
+            </a:r>
+          </a:p>
+          <a:p>
+            <a:r>
+              <a:rPr lang="en-US" sz="1000" dirty="0"/>
+              <a:t>    while value &gt; MAX_STARTING_MONEY or value &lt;= 0:</a:t>
+            </a:r>
+          </a:p>
+          <a:p>
+            <a:r>
+              <a:rPr lang="en-US" sz="1000" dirty="0"/>
+              <a:t>        try:</a:t>
+            </a:r>
+          </a:p>
+          <a:p>
+            <a:r>
+              <a:rPr lang="en-US" sz="1000" dirty="0"/>
+              <a:t>            value = float(input(</a:t>
+            </a:r>
+            <a:r>
+              <a:rPr lang="en-US" sz="1000" dirty="0" err="1"/>
+              <a:t>f"Input</a:t>
+            </a:r>
+            <a:r>
+              <a:rPr lang="en-US" sz="1000" dirty="0"/>
+              <a:t> payment of initial amount (0-{MAX_STARTING_MONEY}): "))</a:t>
+            </a:r>
+          </a:p>
+          <a:p>
+            <a:r>
+              <a:rPr lang="en-US" sz="1000" dirty="0"/>
+              <a:t>            if value &gt; MAX_STARTING_MONEY or value &lt;= 0:</a:t>
+            </a:r>
+          </a:p>
+          <a:p>
+            <a:r>
+              <a:rPr lang="en-US" sz="1000" dirty="0"/>
+              <a:t>                print("Invalid input. Please try again.")</a:t>
+            </a:r>
+          </a:p>
+          <a:p>
+            <a:r>
+              <a:rPr lang="en-US" sz="1000" dirty="0"/>
+              <a:t>        except </a:t>
+            </a:r>
+            <a:r>
+              <a:rPr lang="en-US" sz="1000" dirty="0" err="1"/>
+              <a:t>ValueError</a:t>
+            </a:r>
+            <a:r>
+              <a:rPr lang="en-US" sz="1000" dirty="0"/>
+              <a:t>:</a:t>
+            </a:r>
+          </a:p>
+          <a:p>
+            <a:r>
+              <a:rPr lang="en-US" sz="1000" dirty="0"/>
+              <a:t>            print("Invalid input. Please try again.")</a:t>
+            </a:r>
+          </a:p>
+          <a:p>
+            <a:r>
+              <a:rPr lang="en-US" sz="1000" dirty="0"/>
+              <a:t>    return value</a:t>
+            </a:r>
+            <a:endParaRPr lang="en-NZ" sz="1000" dirty="0"/>
+          </a:p>
+        </p:txBody>
+      </p:sp>
+      <p:sp>
+        <p:nvSpPr>
+          <p:cNvPr id="7" name="TextBox 6">
+            <a:extLst>
+              <a:ext uri="{FF2B5EF4-FFF2-40B4-BE49-F238E27FC236}">
+                <a16:creationId xmlns:a16="http://schemas.microsoft.com/office/drawing/2014/main" id="{BB538C66-A9AB-9292-BE01-D913E793E060}"/>
+              </a:ext>
+            </a:extLst>
+          </p:cNvPr>
+          <p:cNvSpPr txBox="1"/>
+          <p:nvPr/>
+        </p:nvSpPr>
+        <p:spPr>
+          <a:xfrm>
+            <a:off x="8182707" y="2004022"/>
+            <a:ext cx="4009293" cy="2554545"/>
+          </a:xfrm>
+          <a:prstGeom prst="rect">
+            <a:avLst/>
+          </a:prstGeom>
+          <a:noFill/>
+        </p:spPr>
+        <p:txBody>
+          <a:bodyPr wrap="square" rtlCol="0">
+            <a:spAutoFit/>
+          </a:bodyPr>
+          <a:lstStyle/>
+          <a:p>
+            <a:r>
+              <a:rPr lang="en-NZ" sz="1000" dirty="0"/>
+              <a:t>def </a:t>
+            </a:r>
+            <a:r>
+              <a:rPr lang="en-NZ" sz="1000" dirty="0" err="1"/>
+              <a:t>calculate_money_change</a:t>
+            </a:r>
+            <a:r>
+              <a:rPr lang="en-NZ" sz="1000" dirty="0"/>
+              <a:t>(token):</a:t>
+            </a:r>
+          </a:p>
+          <a:p>
+            <a:r>
+              <a:rPr lang="en-NZ" sz="1000" dirty="0"/>
+              <a:t>    # I used literal strings instead of indexes, as indexes may change</a:t>
+            </a:r>
+          </a:p>
+          <a:p>
+            <a:r>
+              <a:rPr lang="en-NZ" sz="1000" dirty="0"/>
+              <a:t>    if token == "unicorn":</a:t>
+            </a:r>
+          </a:p>
+          <a:p>
+            <a:r>
+              <a:rPr lang="en-NZ" sz="1000" dirty="0"/>
+              <a:t>        </a:t>
+            </a:r>
+            <a:r>
+              <a:rPr lang="en-NZ" sz="1000" dirty="0" err="1"/>
+              <a:t>print_prize_message</a:t>
+            </a:r>
+            <a:r>
+              <a:rPr lang="en-NZ" sz="1000" dirty="0"/>
+              <a:t>(UNICORN_PRIZE_MONEY)</a:t>
+            </a:r>
+          </a:p>
+          <a:p>
+            <a:r>
+              <a:rPr lang="en-NZ" sz="1000" dirty="0"/>
+              <a:t>        return UNICORN_PRIZE_MONEY</a:t>
+            </a:r>
+          </a:p>
+          <a:p>
+            <a:r>
+              <a:rPr lang="en-NZ" sz="1000" dirty="0"/>
+              <a:t>    </a:t>
+            </a:r>
+            <a:r>
+              <a:rPr lang="en-NZ" sz="1000" dirty="0" err="1"/>
+              <a:t>elif</a:t>
+            </a:r>
+            <a:r>
+              <a:rPr lang="en-NZ" sz="1000" dirty="0"/>
+              <a:t> token == "zebra":</a:t>
+            </a:r>
+          </a:p>
+          <a:p>
+            <a:r>
+              <a:rPr lang="en-NZ" sz="1000" dirty="0"/>
+              <a:t>        </a:t>
+            </a:r>
+            <a:r>
+              <a:rPr lang="en-NZ" sz="1000" dirty="0" err="1"/>
+              <a:t>print_prize_message</a:t>
+            </a:r>
+            <a:r>
+              <a:rPr lang="en-NZ" sz="1000" dirty="0"/>
+              <a:t>(ZEBRA_PRIZE_MONEY)</a:t>
+            </a:r>
+          </a:p>
+          <a:p>
+            <a:r>
+              <a:rPr lang="en-NZ" sz="1000" dirty="0"/>
+              <a:t>        return ZEBRA_PRIZE_MONEY</a:t>
+            </a:r>
+          </a:p>
+          <a:p>
+            <a:r>
+              <a:rPr lang="en-NZ" sz="1000" dirty="0"/>
+              <a:t>    </a:t>
+            </a:r>
+            <a:r>
+              <a:rPr lang="en-NZ" sz="1000" dirty="0" err="1"/>
+              <a:t>elif</a:t>
+            </a:r>
+            <a:r>
+              <a:rPr lang="en-NZ" sz="1000" dirty="0"/>
+              <a:t> token == "horse":</a:t>
+            </a:r>
+          </a:p>
+          <a:p>
+            <a:r>
+              <a:rPr lang="en-NZ" sz="1000" dirty="0"/>
+              <a:t>        </a:t>
+            </a:r>
+            <a:r>
+              <a:rPr lang="en-NZ" sz="1000" dirty="0" err="1"/>
+              <a:t>print_prize_message</a:t>
+            </a:r>
+            <a:r>
+              <a:rPr lang="en-NZ" sz="1000" dirty="0"/>
+              <a:t>(HORSE_PRIZE_MONEY)</a:t>
+            </a:r>
+          </a:p>
+          <a:p>
+            <a:r>
+              <a:rPr lang="en-NZ" sz="1000" dirty="0"/>
+              <a:t>        return HORSE_PRIZE_MONEY</a:t>
+            </a:r>
+          </a:p>
+          <a:p>
+            <a:r>
+              <a:rPr lang="en-NZ" sz="1000" dirty="0"/>
+              <a:t>    </a:t>
+            </a:r>
+            <a:r>
+              <a:rPr lang="en-NZ" sz="1000" dirty="0" err="1"/>
+              <a:t>elif</a:t>
+            </a:r>
+            <a:r>
+              <a:rPr lang="en-NZ" sz="1000" dirty="0"/>
+              <a:t> token == "donkey":</a:t>
+            </a:r>
+          </a:p>
+          <a:p>
+            <a:r>
+              <a:rPr lang="en-NZ" sz="1000" dirty="0"/>
+              <a:t>        </a:t>
+            </a:r>
+            <a:r>
+              <a:rPr lang="en-NZ" sz="1000" dirty="0" err="1"/>
+              <a:t>print_prize_message</a:t>
+            </a:r>
+            <a:r>
+              <a:rPr lang="en-NZ" sz="1000" dirty="0"/>
+              <a:t>(DONKEY_PRIZE_MONEY)</a:t>
+            </a:r>
+          </a:p>
+          <a:p>
+            <a:r>
+              <a:rPr lang="en-NZ" sz="1000" dirty="0"/>
+              <a:t>        return DONKEY_PRIZE_MONEY</a:t>
+            </a:r>
+          </a:p>
+          <a:p>
+            <a:r>
+              <a:rPr lang="en-NZ" sz="1000" dirty="0"/>
+              <a:t>    else:</a:t>
+            </a:r>
+          </a:p>
+          <a:p>
+            <a:r>
+              <a:rPr lang="en-NZ" sz="1000" dirty="0"/>
+              <a:t>        return 0</a:t>
+            </a:r>
+          </a:p>
+        </p:txBody>
+      </p:sp>
+      <p:sp>
+        <p:nvSpPr>
+          <p:cNvPr id="8" name="TextBox 7">
+            <a:extLst>
+              <a:ext uri="{FF2B5EF4-FFF2-40B4-BE49-F238E27FC236}">
+                <a16:creationId xmlns:a16="http://schemas.microsoft.com/office/drawing/2014/main" id="{5741FB59-CE58-B773-73C4-D33E7B669B7D}"/>
+              </a:ext>
+            </a:extLst>
+          </p:cNvPr>
+          <p:cNvSpPr txBox="1"/>
+          <p:nvPr/>
+        </p:nvSpPr>
+        <p:spPr>
+          <a:xfrm>
+            <a:off x="8299938" y="4858216"/>
+            <a:ext cx="3305908" cy="1938992"/>
+          </a:xfrm>
+          <a:prstGeom prst="rect">
+            <a:avLst/>
+          </a:prstGeom>
+          <a:noFill/>
+        </p:spPr>
+        <p:txBody>
+          <a:bodyPr wrap="square" rtlCol="0">
+            <a:spAutoFit/>
+          </a:bodyPr>
+          <a:lstStyle/>
+          <a:p>
+            <a:r>
+              <a:rPr lang="en-NZ" sz="1000" dirty="0"/>
+              <a:t>def </a:t>
+            </a:r>
+            <a:r>
+              <a:rPr lang="en-NZ" sz="1000" dirty="0" err="1"/>
+              <a:t>calculate_money_change</a:t>
+            </a:r>
+            <a:r>
+              <a:rPr lang="en-NZ" sz="1000" dirty="0"/>
+              <a:t>(token):</a:t>
+            </a:r>
+          </a:p>
+          <a:p>
+            <a:r>
+              <a:rPr lang="en-NZ" sz="1000" dirty="0"/>
+              <a:t>    </a:t>
+            </a:r>
+            <a:r>
+              <a:rPr lang="en-NZ" sz="1000" dirty="0" err="1"/>
+              <a:t>prize_money</a:t>
+            </a:r>
+            <a:r>
+              <a:rPr lang="en-NZ" sz="1000" dirty="0"/>
+              <a:t> = {</a:t>
+            </a:r>
+          </a:p>
+          <a:p>
+            <a:r>
+              <a:rPr lang="en-NZ" sz="1000" dirty="0"/>
+              <a:t>        "unicorn": UNICORN_PRIZE_MONEY,</a:t>
+            </a:r>
+          </a:p>
+          <a:p>
+            <a:r>
+              <a:rPr lang="en-NZ" sz="1000" dirty="0"/>
+              <a:t>        "zebra": ZEBRA_PRIZE_MONEY,</a:t>
+            </a:r>
+          </a:p>
+          <a:p>
+            <a:r>
+              <a:rPr lang="en-NZ" sz="1000" dirty="0"/>
+              <a:t>        "horse": HORSE_PRIZE_MONEY,</a:t>
+            </a:r>
+          </a:p>
+          <a:p>
+            <a:r>
+              <a:rPr lang="en-NZ" sz="1000" dirty="0"/>
+              <a:t>        "donkey": DONKEY_PRIZE_MONEY</a:t>
+            </a:r>
+          </a:p>
+          <a:p>
+            <a:r>
+              <a:rPr lang="en-NZ" sz="1000" dirty="0"/>
+              <a:t>    }</a:t>
+            </a:r>
+          </a:p>
+          <a:p>
+            <a:r>
+              <a:rPr lang="en-NZ" sz="1000" dirty="0"/>
+              <a:t>    if token in </a:t>
+            </a:r>
+            <a:r>
+              <a:rPr lang="en-NZ" sz="1000" dirty="0" err="1"/>
+              <a:t>prize_money</a:t>
+            </a:r>
+            <a:r>
+              <a:rPr lang="en-NZ" sz="1000" dirty="0"/>
+              <a:t>:</a:t>
+            </a:r>
+          </a:p>
+          <a:p>
+            <a:r>
+              <a:rPr lang="en-NZ" sz="1000" dirty="0"/>
+              <a:t>        </a:t>
+            </a:r>
+            <a:r>
+              <a:rPr lang="en-NZ" sz="1000" dirty="0" err="1"/>
+              <a:t>print_prize_message</a:t>
+            </a:r>
+            <a:r>
+              <a:rPr lang="en-NZ" sz="1000" dirty="0"/>
+              <a:t>(</a:t>
+            </a:r>
+            <a:r>
+              <a:rPr lang="en-NZ" sz="1000" dirty="0" err="1"/>
+              <a:t>prize_money</a:t>
+            </a:r>
+            <a:r>
+              <a:rPr lang="en-NZ" sz="1000" dirty="0"/>
+              <a:t>[token])</a:t>
+            </a:r>
+          </a:p>
+          <a:p>
+            <a:r>
+              <a:rPr lang="en-NZ" sz="1000" dirty="0"/>
+              <a:t>        return </a:t>
+            </a:r>
+            <a:r>
+              <a:rPr lang="en-NZ" sz="1000" dirty="0" err="1"/>
+              <a:t>prize_money</a:t>
+            </a:r>
+            <a:r>
+              <a:rPr lang="en-NZ" sz="1000" dirty="0"/>
+              <a:t>[token]</a:t>
+            </a:r>
+          </a:p>
+          <a:p>
+            <a:r>
+              <a:rPr lang="en-NZ" sz="1000" dirty="0"/>
+              <a:t>    else:</a:t>
+            </a:r>
+          </a:p>
+          <a:p>
+            <a:r>
+              <a:rPr lang="en-NZ" sz="1000" dirty="0"/>
+              <a:t>        return 0</a:t>
+            </a:r>
           </a:p>
         </p:txBody>
       </p:sp>
@@ -7501,7 +8158,7 @@
           <a:p>
             <a:r>
               <a:rPr lang="en-NZ" dirty="0"/>
-              <a:t>[Component name]: Testing </a:t>
+              <a:t>Testing </a:t>
             </a:r>
           </a:p>
         </p:txBody>

</xml_diff>

<commit_message>
Update 1.7 and 1.8 documentation .pptx
</commit_message>
<xml_diff>
--- a/More Files/1.7 and 1.8 documentation .pptx
+++ b/More Files/1.7 and 1.8 documentation .pptx
@@ -129,7 +129,7 @@
 <file path=ppt/revisionInfo.xml><?xml version="1.0" encoding="utf-8"?>
 <p1510:revInfo xmlns:a="http://schemas.openxmlformats.org/drawingml/2006/main" xmlns:r="http://schemas.openxmlformats.org/officeDocument/2006/relationships" xmlns:p1510="http://schemas.microsoft.com/office/powerpoint/2015/10/main">
   <p1510:revLst>
-    <p1510:client id="{4136A639-6618-4C31-B3B8-A4CEEAA0AB2F}" v="23" dt="2023-04-04T23:23:12.567"/>
+    <p1510:client id="{4136A639-6618-4C31-B3B8-A4CEEAA0AB2F}" v="24" dt="2023-04-05T23:31:20.514"/>
   </p1510:revLst>
 </p1510:revInfo>
 </file>
@@ -139,7 +139,7 @@
   <pc:docChgLst>
     <pc:chgData name="Nathan Tasker" userId="7fb81501-9544-4351-adeb-2fbdcdb67d30" providerId="ADAL" clId="{4136A639-6618-4C31-B3B8-A4CEEAA0AB2F}"/>
     <pc:docChg chg="undo custSel modSld">
-      <pc:chgData name="Nathan Tasker" userId="7fb81501-9544-4351-adeb-2fbdcdb67d30" providerId="ADAL" clId="{4136A639-6618-4C31-B3B8-A4CEEAA0AB2F}" dt="2023-04-04T23:32:17.992" v="919" actId="1076"/>
+      <pc:chgData name="Nathan Tasker" userId="7fb81501-9544-4351-adeb-2fbdcdb67d30" providerId="ADAL" clId="{4136A639-6618-4C31-B3B8-A4CEEAA0AB2F}" dt="2023-04-05T23:33:07.926" v="1268" actId="20577"/>
       <pc:docMkLst>
         <pc:docMk/>
       </pc:docMkLst>
@@ -203,6 +203,36 @@
             <ac:picMk id="7" creationId="{984CE96E-FE1E-0C82-EA36-F8EBC9954E25}"/>
           </ac:picMkLst>
         </pc:picChg>
+      </pc:sldChg>
+      <pc:sldChg chg="modSp mod">
+        <pc:chgData name="Nathan Tasker" userId="7fb81501-9544-4351-adeb-2fbdcdb67d30" providerId="ADAL" clId="{4136A639-6618-4C31-B3B8-A4CEEAA0AB2F}" dt="2023-04-05T23:21:36.622" v="989" actId="20577"/>
+        <pc:sldMkLst>
+          <pc:docMk/>
+          <pc:sldMk cId="1357549755" sldId="261"/>
+        </pc:sldMkLst>
+        <pc:spChg chg="mod">
+          <ac:chgData name="Nathan Tasker" userId="7fb81501-9544-4351-adeb-2fbdcdb67d30" providerId="ADAL" clId="{4136A639-6618-4C31-B3B8-A4CEEAA0AB2F}" dt="2023-04-05T23:21:36.622" v="989" actId="20577"/>
+          <ac:spMkLst>
+            <pc:docMk/>
+            <pc:sldMk cId="1357549755" sldId="261"/>
+            <ac:spMk id="3" creationId="{A89172B1-B985-48A3-8018-FC6FF45BCE4F}"/>
+          </ac:spMkLst>
+        </pc:spChg>
+      </pc:sldChg>
+      <pc:sldChg chg="addSp modSp mod">
+        <pc:chgData name="Nathan Tasker" userId="7fb81501-9544-4351-adeb-2fbdcdb67d30" providerId="ADAL" clId="{4136A639-6618-4C31-B3B8-A4CEEAA0AB2F}" dt="2023-04-05T23:33:07.926" v="1268" actId="20577"/>
+        <pc:sldMkLst>
+          <pc:docMk/>
+          <pc:sldMk cId="2276153040" sldId="266"/>
+        </pc:sldMkLst>
+        <pc:spChg chg="add mod">
+          <ac:chgData name="Nathan Tasker" userId="7fb81501-9544-4351-adeb-2fbdcdb67d30" providerId="ADAL" clId="{4136A639-6618-4C31-B3B8-A4CEEAA0AB2F}" dt="2023-04-05T23:33:07.926" v="1268" actId="20577"/>
+          <ac:spMkLst>
+            <pc:docMk/>
+            <pc:sldMk cId="2276153040" sldId="266"/>
+            <ac:spMk id="4" creationId="{445842E5-367F-94E0-B6AD-D654165192D8}"/>
+          </ac:spMkLst>
+        </pc:spChg>
       </pc:sldChg>
       <pc:sldChg chg="addSp modSp mod">
         <pc:chgData name="Nathan Tasker" userId="7fb81501-9544-4351-adeb-2fbdcdb67d30" providerId="ADAL" clId="{4136A639-6618-4C31-B3B8-A4CEEAA0AB2F}" dt="2023-03-29T22:14:47.057" v="205" actId="20577"/>
@@ -486,7 +516,7 @@
           <a:p>
             <a:fld id="{F37D28C0-BEB6-42B0-A203-EEE1023219C4}" type="datetimeFigureOut">
               <a:rPr lang="en-NZ" smtClean="0"/>
-              <a:t>5/04/2023</a:t>
+              <a:t>6/04/2023</a:t>
             </a:fld>
             <a:endParaRPr lang="en-NZ"/>
           </a:p>
@@ -1887,7 +1917,7 @@
           <a:p>
             <a:fld id="{9C4A4F43-1C06-40E6-8F87-8B286982E50E}" type="datetimeFigureOut">
               <a:rPr lang="en-NZ" smtClean="0"/>
-              <a:t>5/04/2023</a:t>
+              <a:t>6/04/2023</a:t>
             </a:fld>
             <a:endParaRPr lang="en-NZ" dirty="0"/>
           </a:p>
@@ -2087,7 +2117,7 @@
           <a:p>
             <a:fld id="{9C4A4F43-1C06-40E6-8F87-8B286982E50E}" type="datetimeFigureOut">
               <a:rPr lang="en-NZ" smtClean="0"/>
-              <a:t>5/04/2023</a:t>
+              <a:t>6/04/2023</a:t>
             </a:fld>
             <a:endParaRPr lang="en-NZ" dirty="0"/>
           </a:p>
@@ -2297,7 +2327,7 @@
           <a:p>
             <a:fld id="{9C4A4F43-1C06-40E6-8F87-8B286982E50E}" type="datetimeFigureOut">
               <a:rPr lang="en-NZ" smtClean="0"/>
-              <a:t>5/04/2023</a:t>
+              <a:t>6/04/2023</a:t>
             </a:fld>
             <a:endParaRPr lang="en-NZ" dirty="0"/>
           </a:p>
@@ -2856,7 +2886,7 @@
           <a:p>
             <a:fld id="{9C4A4F43-1C06-40E6-8F87-8B286982E50E}" type="datetimeFigureOut">
               <a:rPr lang="en-NZ" smtClean="0"/>
-              <a:t>5/04/2023</a:t>
+              <a:t>6/04/2023</a:t>
             </a:fld>
             <a:endParaRPr lang="en-NZ" dirty="0"/>
           </a:p>
@@ -3132,7 +3162,7 @@
           <a:p>
             <a:fld id="{9C4A4F43-1C06-40E6-8F87-8B286982E50E}" type="datetimeFigureOut">
               <a:rPr lang="en-NZ" smtClean="0"/>
-              <a:t>5/04/2023</a:t>
+              <a:t>6/04/2023</a:t>
             </a:fld>
             <a:endParaRPr lang="en-NZ" dirty="0"/>
           </a:p>
@@ -3400,7 +3430,7 @@
           <a:p>
             <a:fld id="{9C4A4F43-1C06-40E6-8F87-8B286982E50E}" type="datetimeFigureOut">
               <a:rPr lang="en-NZ" smtClean="0"/>
-              <a:t>5/04/2023</a:t>
+              <a:t>6/04/2023</a:t>
             </a:fld>
             <a:endParaRPr lang="en-NZ" dirty="0"/>
           </a:p>
@@ -3815,7 +3845,7 @@
           <a:p>
             <a:fld id="{9C4A4F43-1C06-40E6-8F87-8B286982E50E}" type="datetimeFigureOut">
               <a:rPr lang="en-NZ" smtClean="0"/>
-              <a:t>5/04/2023</a:t>
+              <a:t>6/04/2023</a:t>
             </a:fld>
             <a:endParaRPr lang="en-NZ" dirty="0"/>
           </a:p>
@@ -3957,7 +3987,7 @@
           <a:p>
             <a:fld id="{9C4A4F43-1C06-40E6-8F87-8B286982E50E}" type="datetimeFigureOut">
               <a:rPr lang="en-NZ" smtClean="0"/>
-              <a:t>5/04/2023</a:t>
+              <a:t>6/04/2023</a:t>
             </a:fld>
             <a:endParaRPr lang="en-NZ" dirty="0"/>
           </a:p>
@@ -4070,7 +4100,7 @@
           <a:p>
             <a:fld id="{9C4A4F43-1C06-40E6-8F87-8B286982E50E}" type="datetimeFigureOut">
               <a:rPr lang="en-NZ" smtClean="0"/>
-              <a:t>5/04/2023</a:t>
+              <a:t>6/04/2023</a:t>
             </a:fld>
             <a:endParaRPr lang="en-NZ" dirty="0"/>
           </a:p>
@@ -4383,7 +4413,7 @@
           <a:p>
             <a:fld id="{9C4A4F43-1C06-40E6-8F87-8B286982E50E}" type="datetimeFigureOut">
               <a:rPr lang="en-NZ" smtClean="0"/>
-              <a:t>5/04/2023</a:t>
+              <a:t>6/04/2023</a:t>
             </a:fld>
             <a:endParaRPr lang="en-NZ" dirty="0"/>
           </a:p>
@@ -4672,7 +4702,7 @@
           <a:p>
             <a:fld id="{9C4A4F43-1C06-40E6-8F87-8B286982E50E}" type="datetimeFigureOut">
               <a:rPr lang="en-NZ" smtClean="0"/>
-              <a:t>5/04/2023</a:t>
+              <a:t>6/04/2023</a:t>
             </a:fld>
             <a:endParaRPr lang="en-NZ" dirty="0"/>
           </a:p>
@@ -4915,7 +4945,7 @@
           <a:p>
             <a:fld id="{9C4A4F43-1C06-40E6-8F87-8B286982E50E}" type="datetimeFigureOut">
               <a:rPr lang="en-NZ" smtClean="0"/>
-              <a:t>5/04/2023</a:t>
+              <a:t>6/04/2023</a:t>
             </a:fld>
             <a:endParaRPr lang="en-NZ" dirty="0"/>
           </a:p>
@@ -5750,7 +5780,7 @@
         <p:spPr>
           <a:xfrm>
             <a:off x="675639" y="1081088"/>
-            <a:ext cx="9513815" cy="1020921"/>
+            <a:ext cx="9513815" cy="1658018"/>
           </a:xfrm>
           <a:prstGeom prst="rect">
             <a:avLst/>
@@ -5776,6 +5806,25 @@
                 <a:ea typeface="Arial" panose="020B0604020202020204" pitchFamily="34" charset="0"/>
               </a:rPr>
               <a:t>Your version control evidence should go here.  This could be in the form of screenshots (both of your GitHub repository as well as your local project folder) as evidence of your incremental development.</a:t>
+            </a:r>
+            <a:br>
+              <a:rPr lang="en-NZ" i="1" dirty="0">
+                <a:latin typeface="Arial" panose="020B0604020202020204" pitchFamily="34" charset="0"/>
+                <a:ea typeface="Arial" panose="020B0604020202020204" pitchFamily="34" charset="0"/>
+              </a:rPr>
+            </a:br>
+            <a:br>
+              <a:rPr lang="en-NZ" i="1" dirty="0">
+                <a:latin typeface="Arial" panose="020B0604020202020204" pitchFamily="34" charset="0"/>
+                <a:ea typeface="Arial" panose="020B0604020202020204" pitchFamily="34" charset="0"/>
+              </a:rPr>
+            </a:br>
+            <a:r>
+              <a:rPr lang="en-NZ" i="1" dirty="0">
+                <a:latin typeface="Arial" panose="020B0604020202020204" pitchFamily="34" charset="0"/>
+                <a:ea typeface="Arial" panose="020B0604020202020204" pitchFamily="34" charset="0"/>
+              </a:rPr>
+              <a:t>Versions are in the “versions” folder</a:t>
             </a:r>
             <a:endParaRPr lang="en-NZ" dirty="0">
               <a:latin typeface="Arial" panose="020B0604020202020204" pitchFamily="34" charset="0"/>
@@ -5881,6 +5930,55 @@
                 <a:latin typeface="Arial" panose="020B0604020202020204" pitchFamily="34" charset="0"/>
               </a:rPr>
               <a:t>Discuss how the information from planning, testing and trialling of components assisted in the development of a high-quality outcome.</a:t>
+            </a:r>
+          </a:p>
+        </p:txBody>
+      </p:sp>
+      <p:sp>
+        <p:nvSpPr>
+          <p:cNvPr id="4" name="TextBox 3">
+            <a:extLst>
+              <a:ext uri="{FF2B5EF4-FFF2-40B4-BE49-F238E27FC236}">
+                <a16:creationId xmlns:a16="http://schemas.microsoft.com/office/drawing/2014/main" id="{445842E5-367F-94E0-B6AD-D654165192D8}"/>
+              </a:ext>
+            </a:extLst>
+          </p:cNvPr>
+          <p:cNvSpPr txBox="1"/>
+          <p:nvPr/>
+        </p:nvSpPr>
+        <p:spPr>
+          <a:xfrm>
+            <a:off x="1467059" y="3074796"/>
+            <a:ext cx="8941358" cy="923330"/>
+          </a:xfrm>
+          <a:prstGeom prst="rect">
+            <a:avLst/>
+          </a:prstGeom>
+          <a:noFill/>
+        </p:spPr>
+        <p:txBody>
+          <a:bodyPr wrap="none" rtlCol="0">
+            <a:spAutoFit/>
+          </a:bodyPr>
+          <a:lstStyle/>
+          <a:p>
+            <a:r>
+              <a:rPr lang="en-NZ" dirty="0"/>
+              <a:t>Planning helped break down the code into manageable components that are easy to focus on</a:t>
+            </a:r>
+            <a:br>
+              <a:rPr lang="en-NZ" dirty="0"/>
+            </a:br>
+            <a:r>
+              <a:rPr lang="en-NZ" dirty="0"/>
+              <a:t>Testing helped check that the code worked as intended</a:t>
+            </a:r>
+            <a:br>
+              <a:rPr lang="en-NZ" dirty="0"/>
+            </a:br>
+            <a:r>
+              <a:rPr lang="en-NZ" dirty="0"/>
+              <a:t>Trialling helped me find better solutions (neater and less computationally expensive)</a:t>
             </a:r>
           </a:p>
         </p:txBody>

</xml_diff>